<commit_message>
Project 1 Due Date change
</commit_message>
<xml_diff>
--- a/Class 7.pptx
+++ b/Class 7.pptx
@@ -226,7 +226,7 @@
           <a:p>
             <a:fld id="{91553857-FF24-F64E-8D31-96B246FE7FC7}" type="datetimeFigureOut">
               <a:rPr lang="en-US" smtClean="0"/>
-              <a:t>9/17/18</a:t>
+              <a:t>9/18/18</a:t>
             </a:fld>
             <a:endParaRPr lang="en-US"/>
           </a:p>
@@ -662,7 +662,7 @@
           <a:p>
             <a:fld id="{C42C6571-5E6A-784B-B936-D3B05221CD33}" type="datetimeFigureOut">
               <a:rPr lang="en-US" smtClean="0"/>
-              <a:t>9/17/18</a:t>
+              <a:t>9/18/18</a:t>
             </a:fld>
             <a:endParaRPr lang="en-US"/>
           </a:p>
@@ -987,7 +987,7 @@
           <a:p>
             <a:fld id="{C42C6571-5E6A-784B-B936-D3B05221CD33}" type="datetimeFigureOut">
               <a:rPr lang="en-US" smtClean="0"/>
-              <a:t>9/17/18</a:t>
+              <a:t>9/18/18</a:t>
             </a:fld>
             <a:endParaRPr lang="en-US"/>
           </a:p>
@@ -1162,7 +1162,7 @@
           <a:p>
             <a:fld id="{C42C6571-5E6A-784B-B936-D3B05221CD33}" type="datetimeFigureOut">
               <a:rPr lang="en-US" smtClean="0"/>
-              <a:t>9/17/18</a:t>
+              <a:t>9/18/18</a:t>
             </a:fld>
             <a:endParaRPr lang="en-US"/>
           </a:p>
@@ -1331,7 +1331,7 @@
           <a:p>
             <a:fld id="{C42C6571-5E6A-784B-B936-D3B05221CD33}" type="datetimeFigureOut">
               <a:rPr lang="en-US" smtClean="0"/>
-              <a:t>9/17/18</a:t>
+              <a:t>9/18/18</a:t>
             </a:fld>
             <a:endParaRPr lang="en-US"/>
           </a:p>
@@ -1603,7 +1603,7 @@
           <a:p>
             <a:fld id="{C42C6571-5E6A-784B-B936-D3B05221CD33}" type="datetimeFigureOut">
               <a:rPr lang="en-US" smtClean="0"/>
-              <a:t>9/17/18</a:t>
+              <a:t>9/18/18</a:t>
             </a:fld>
             <a:endParaRPr lang="en-US"/>
           </a:p>
@@ -1992,7 +1992,7 @@
           <a:p>
             <a:fld id="{C42C6571-5E6A-784B-B936-D3B05221CD33}" type="datetimeFigureOut">
               <a:rPr lang="en-US" smtClean="0"/>
-              <a:t>9/17/18</a:t>
+              <a:t>9/18/18</a:t>
             </a:fld>
             <a:endParaRPr lang="en-US"/>
           </a:p>
@@ -2464,7 +2464,7 @@
           <a:p>
             <a:fld id="{C42C6571-5E6A-784B-B936-D3B05221CD33}" type="datetimeFigureOut">
               <a:rPr lang="en-US" smtClean="0"/>
-              <a:t>9/17/18</a:t>
+              <a:t>9/18/18</a:t>
             </a:fld>
             <a:endParaRPr lang="en-US"/>
           </a:p>
@@ -2577,7 +2577,7 @@
           <a:p>
             <a:fld id="{C42C6571-5E6A-784B-B936-D3B05221CD33}" type="datetimeFigureOut">
               <a:rPr lang="en-US" smtClean="0"/>
-              <a:t>9/17/18</a:t>
+              <a:t>9/18/18</a:t>
             </a:fld>
             <a:endParaRPr lang="en-US"/>
           </a:p>
@@ -2667,7 +2667,7 @@
           <a:p>
             <a:fld id="{C42C6571-5E6A-784B-B936-D3B05221CD33}" type="datetimeFigureOut">
               <a:rPr lang="en-US" smtClean="0"/>
-              <a:t>9/17/18</a:t>
+              <a:t>9/18/18</a:t>
             </a:fld>
             <a:endParaRPr lang="en-US"/>
           </a:p>
@@ -3008,7 +3008,7 @@
           <a:p>
             <a:fld id="{C42C6571-5E6A-784B-B936-D3B05221CD33}" type="datetimeFigureOut">
               <a:rPr lang="en-US" smtClean="0"/>
-              <a:t>9/17/18</a:t>
+              <a:t>9/18/18</a:t>
             </a:fld>
             <a:endParaRPr lang="en-US"/>
           </a:p>
@@ -3391,7 +3391,7 @@
           <a:p>
             <a:fld id="{C42C6571-5E6A-784B-B936-D3B05221CD33}" type="datetimeFigureOut">
               <a:rPr lang="en-US" smtClean="0"/>
-              <a:t>9/17/18</a:t>
+              <a:t>9/18/18</a:t>
             </a:fld>
             <a:endParaRPr lang="en-US"/>
           </a:p>
@@ -3664,7 +3664,7 @@
           <a:p>
             <a:fld id="{C42C6571-5E6A-784B-B936-D3B05221CD33}" type="datetimeFigureOut">
               <a:rPr lang="en-US" smtClean="0"/>
-              <a:t>9/17/18</a:t>
+              <a:t>9/18/18</a:t>
             </a:fld>
             <a:endParaRPr lang="en-US"/>
           </a:p>
@@ -9745,7 +9745,7 @@
           <a:p>
             <a:r>
               <a:rPr lang="en-US" dirty="0"/>
-              <a:t>Project 1</a:t>
+              <a:t>Project 1: Due SUNDAY (Sept 23rd) at NOON</a:t>
             </a:r>
           </a:p>
         </p:txBody>

</xml_diff>